<commit_message>
Bao cao tuan 1
</commit_message>
<xml_diff>
--- a/baocaotuan1.pptx
+++ b/baocaotuan1.pptx
@@ -3734,13 +3734,18 @@
               <a:t>chất</a:t>
             </a:r>
             <a:r>
-              <a:rPr lang="en-US" sz="3000" dirty="0">
+              <a:rPr lang="vi-VN" sz="3000" dirty="0">
                 <a:solidFill>
                   <a:schemeClr val="bg1"/>
                 </a:solidFill>
               </a:rPr>
               <a:t>:</a:t>
             </a:r>
+            <a:endParaRPr lang="en-US" sz="3000" dirty="0">
+              <a:solidFill>
+                <a:schemeClr val="bg1"/>
+              </a:solidFill>
+            </a:endParaRPr>
           </a:p>
           <a:p>
             <a:pPr marL="800100" lvl="1" indent="-342900">

</xml_diff>